<commit_message>
added white background to images + adapted git.pdf
</commit_message>
<xml_diff>
--- a/assets/images/WhatIsGit.pptx
+++ b/assets/images/WhatIsGit.pptx
@@ -6,6 +6,7 @@
   </p:sldMasterIdLst>
   <p:sldIdLst>
     <p:sldId id="256" r:id="rId2"/>
+    <p:sldId id="257" r:id="rId3"/>
   </p:sldIdLst>
   <p:sldSz cx="12192000" cy="6858000"/>
   <p:notesSz cx="6858000" cy="9144000"/>
@@ -104,6 +105,11 @@
       </a:defRPr>
     </a:lvl9pPr>
   </p:defaultTextStyle>
+  <p:extLst>
+    <p:ext uri="{EFAFB233-063F-42B5-8137-9DF3F51BA10A}">
+      <p15:sldGuideLst xmlns:p15="http://schemas.microsoft.com/office/powerpoint/2012/main"/>
+    </p:ext>
+  </p:extLst>
 </p:presentation>
 </file>
 
@@ -256,7 +262,7 @@
           <a:p>
             <a:fld id="{6913E35D-7DE2-8346-99F9-DB493A8CDCCD}" type="datetimeFigureOut">
               <a:rPr lang="en-US" smtClean="0"/>
-              <a:t>5/10/21</a:t>
+              <a:t>5/27/21</a:t>
             </a:fld>
             <a:endParaRPr lang="en-US"/>
           </a:p>
@@ -456,7 +462,7 @@
           <a:p>
             <a:fld id="{6913E35D-7DE2-8346-99F9-DB493A8CDCCD}" type="datetimeFigureOut">
               <a:rPr lang="en-US" smtClean="0"/>
-              <a:t>5/10/21</a:t>
+              <a:t>5/27/21</a:t>
             </a:fld>
             <a:endParaRPr lang="en-US"/>
           </a:p>
@@ -666,7 +672,7 @@
           <a:p>
             <a:fld id="{6913E35D-7DE2-8346-99F9-DB493A8CDCCD}" type="datetimeFigureOut">
               <a:rPr lang="en-US" smtClean="0"/>
-              <a:t>5/10/21</a:t>
+              <a:t>5/27/21</a:t>
             </a:fld>
             <a:endParaRPr lang="en-US"/>
           </a:p>
@@ -866,7 +872,7 @@
           <a:p>
             <a:fld id="{6913E35D-7DE2-8346-99F9-DB493A8CDCCD}" type="datetimeFigureOut">
               <a:rPr lang="en-US" smtClean="0"/>
-              <a:t>5/10/21</a:t>
+              <a:t>5/27/21</a:t>
             </a:fld>
             <a:endParaRPr lang="en-US"/>
           </a:p>
@@ -1142,7 +1148,7 @@
           <a:p>
             <a:fld id="{6913E35D-7DE2-8346-99F9-DB493A8CDCCD}" type="datetimeFigureOut">
               <a:rPr lang="en-US" smtClean="0"/>
-              <a:t>5/10/21</a:t>
+              <a:t>5/27/21</a:t>
             </a:fld>
             <a:endParaRPr lang="en-US"/>
           </a:p>
@@ -1410,7 +1416,7 @@
           <a:p>
             <a:fld id="{6913E35D-7DE2-8346-99F9-DB493A8CDCCD}" type="datetimeFigureOut">
               <a:rPr lang="en-US" smtClean="0"/>
-              <a:t>5/10/21</a:t>
+              <a:t>5/27/21</a:t>
             </a:fld>
             <a:endParaRPr lang="en-US"/>
           </a:p>
@@ -1825,7 +1831,7 @@
           <a:p>
             <a:fld id="{6913E35D-7DE2-8346-99F9-DB493A8CDCCD}" type="datetimeFigureOut">
               <a:rPr lang="en-US" smtClean="0"/>
-              <a:t>5/10/21</a:t>
+              <a:t>5/27/21</a:t>
             </a:fld>
             <a:endParaRPr lang="en-US"/>
           </a:p>
@@ -1967,7 +1973,7 @@
           <a:p>
             <a:fld id="{6913E35D-7DE2-8346-99F9-DB493A8CDCCD}" type="datetimeFigureOut">
               <a:rPr lang="en-US" smtClean="0"/>
-              <a:t>5/10/21</a:t>
+              <a:t>5/27/21</a:t>
             </a:fld>
             <a:endParaRPr lang="en-US"/>
           </a:p>
@@ -2080,7 +2086,7 @@
           <a:p>
             <a:fld id="{6913E35D-7DE2-8346-99F9-DB493A8CDCCD}" type="datetimeFigureOut">
               <a:rPr lang="en-US" smtClean="0"/>
-              <a:t>5/10/21</a:t>
+              <a:t>5/27/21</a:t>
             </a:fld>
             <a:endParaRPr lang="en-US"/>
           </a:p>
@@ -2393,7 +2399,7 @@
           <a:p>
             <a:fld id="{6913E35D-7DE2-8346-99F9-DB493A8CDCCD}" type="datetimeFigureOut">
               <a:rPr lang="en-US" smtClean="0"/>
-              <a:t>5/10/21</a:t>
+              <a:t>5/27/21</a:t>
             </a:fld>
             <a:endParaRPr lang="en-US"/>
           </a:p>
@@ -2682,7 +2688,7 @@
           <a:p>
             <a:fld id="{6913E35D-7DE2-8346-99F9-DB493A8CDCCD}" type="datetimeFigureOut">
               <a:rPr lang="en-US" smtClean="0"/>
-              <a:t>5/10/21</a:t>
+              <a:t>5/27/21</a:t>
             </a:fld>
             <a:endParaRPr lang="en-US"/>
           </a:p>
@@ -2925,7 +2931,7 @@
           <a:p>
             <a:fld id="{6913E35D-7DE2-8346-99F9-DB493A8CDCCD}" type="datetimeFigureOut">
               <a:rPr lang="en-US" smtClean="0"/>
-              <a:t>5/10/21</a:t>
+              <a:t>5/27/21</a:t>
             </a:fld>
             <a:endParaRPr lang="en-US"/>
           </a:p>
@@ -3328,6 +3334,14 @@
 <file path=ppt/slides/slide1.xml><?xml version="1.0" encoding="utf-8"?>
 <p:sld xmlns:a="http://schemas.openxmlformats.org/drawingml/2006/main" xmlns:r="http://schemas.openxmlformats.org/officeDocument/2006/relationships" xmlns:p="http://schemas.openxmlformats.org/presentationml/2006/main">
   <p:cSld>
+    <p:bg>
+      <p:bgPr>
+        <a:solidFill>
+          <a:schemeClr val="bg1"/>
+        </a:solidFill>
+        <a:effectLst/>
+      </p:bgPr>
+    </p:bg>
     <p:spTree>
       <p:nvGrpSpPr>
         <p:cNvPr id="1" name=""/>
@@ -3356,7 +3370,7 @@
         </p:nvSpPr>
         <p:spPr>
           <a:xfrm>
-            <a:off x="1082566" y="3142593"/>
+            <a:off x="1465626" y="3154950"/>
             <a:ext cx="914400" cy="914400"/>
           </a:xfrm>
           <a:prstGeom prst="ellipse">
@@ -3410,7 +3424,7 @@
         </p:nvSpPr>
         <p:spPr>
           <a:xfrm>
-            <a:off x="4037121" y="3142593"/>
+            <a:off x="4420181" y="3154950"/>
             <a:ext cx="914400" cy="914400"/>
           </a:xfrm>
           <a:prstGeom prst="ellipse">
@@ -3464,7 +3478,7 @@
         </p:nvSpPr>
         <p:spPr>
           <a:xfrm>
-            <a:off x="5181600" y="3142593"/>
+            <a:off x="5564660" y="3154950"/>
             <a:ext cx="914400" cy="914400"/>
           </a:xfrm>
           <a:prstGeom prst="ellipse">
@@ -3518,7 +3532,7 @@
         </p:nvSpPr>
         <p:spPr>
           <a:xfrm>
-            <a:off x="7704083" y="3142593"/>
+            <a:off x="8087143" y="3154950"/>
             <a:ext cx="914400" cy="914400"/>
           </a:xfrm>
           <a:prstGeom prst="ellipse">
@@ -3572,7 +3586,7 @@
         </p:nvSpPr>
         <p:spPr>
           <a:xfrm>
-            <a:off x="10347434" y="3142593"/>
+            <a:off x="10504208" y="3154950"/>
             <a:ext cx="914400" cy="914400"/>
           </a:xfrm>
           <a:prstGeom prst="ellipse">
@@ -3626,7 +3640,7 @@
         </p:nvSpPr>
         <p:spPr>
           <a:xfrm>
-            <a:off x="3122721" y="1509055"/>
+            <a:off x="3505781" y="1521412"/>
             <a:ext cx="914400" cy="914400"/>
           </a:xfrm>
           <a:prstGeom prst="ellipse">
@@ -3680,7 +3694,7 @@
         </p:nvSpPr>
         <p:spPr>
           <a:xfrm>
-            <a:off x="6096000" y="1508398"/>
+            <a:off x="6479060" y="1520755"/>
             <a:ext cx="914400" cy="914400"/>
           </a:xfrm>
           <a:prstGeom prst="ellipse">
@@ -3734,7 +3748,7 @@
         </p:nvSpPr>
         <p:spPr>
           <a:xfrm>
-            <a:off x="6096000" y="4776788"/>
+            <a:off x="6479060" y="4789145"/>
             <a:ext cx="914400" cy="914400"/>
           </a:xfrm>
           <a:prstGeom prst="ellipse">
@@ -3792,7 +3806,7 @@
         </p:nvCxnSpPr>
         <p:spPr>
           <a:xfrm>
-            <a:off x="1996966" y="3599793"/>
+            <a:off x="2380026" y="3612150"/>
             <a:ext cx="2040155" cy="0"/>
           </a:xfrm>
           <a:prstGeom prst="line">
@@ -3837,7 +3851,7 @@
         </p:nvCxnSpPr>
         <p:spPr>
           <a:xfrm flipH="1">
-            <a:off x="4951521" y="3599793"/>
+            <a:off x="5334581" y="3612150"/>
             <a:ext cx="230079" cy="0"/>
           </a:xfrm>
           <a:prstGeom prst="line">
@@ -3882,7 +3896,7 @@
         </p:nvCxnSpPr>
         <p:spPr>
           <a:xfrm>
-            <a:off x="6096000" y="3599793"/>
+            <a:off x="6479060" y="3612150"/>
             <a:ext cx="1608083" cy="0"/>
           </a:xfrm>
           <a:prstGeom prst="line">
@@ -3920,14 +3934,15 @@
           </p:cNvPr>
           <p:cNvCxnSpPr>
             <a:cxnSpLocks/>
+            <a:stCxn id="7" idx="6"/>
             <a:endCxn id="8" idx="2"/>
           </p:cNvCxnSpPr>
           <p:nvPr/>
         </p:nvCxnSpPr>
         <p:spPr>
           <a:xfrm>
-            <a:off x="8618483" y="3599793"/>
-            <a:ext cx="1728951" cy="0"/>
+            <a:off x="9001543" y="3612150"/>
+            <a:ext cx="1502665" cy="0"/>
           </a:xfrm>
           <a:prstGeom prst="line">
             <a:avLst/>
@@ -3971,7 +3986,7 @@
         </p:nvCxnSpPr>
         <p:spPr>
           <a:xfrm flipV="1">
-            <a:off x="7010400" y="4056993"/>
+            <a:off x="7393460" y="4069350"/>
             <a:ext cx="1150883" cy="1176995"/>
           </a:xfrm>
           <a:prstGeom prst="line">
@@ -4016,7 +4031,7 @@
         </p:nvCxnSpPr>
         <p:spPr>
           <a:xfrm flipH="1" flipV="1">
-            <a:off x="4494321" y="4056993"/>
+            <a:off x="4877381" y="4069350"/>
             <a:ext cx="1601679" cy="1176995"/>
           </a:xfrm>
           <a:prstGeom prst="line">
@@ -4061,7 +4076,7 @@
         </p:nvCxnSpPr>
         <p:spPr>
           <a:xfrm flipV="1">
-            <a:off x="1539766" y="1966255"/>
+            <a:off x="1922826" y="1978612"/>
             <a:ext cx="1582955" cy="1176338"/>
           </a:xfrm>
           <a:prstGeom prst="line">
@@ -4106,7 +4121,7 @@
         </p:nvCxnSpPr>
         <p:spPr>
           <a:xfrm flipH="1">
-            <a:off x="4037121" y="1965598"/>
+            <a:off x="4420181" y="1977955"/>
             <a:ext cx="2058879" cy="657"/>
           </a:xfrm>
           <a:prstGeom prst="line">
@@ -4151,7 +4166,7 @@
         </p:nvCxnSpPr>
         <p:spPr>
           <a:xfrm>
-            <a:off x="7010400" y="1965598"/>
+            <a:off x="7393460" y="1977955"/>
             <a:ext cx="1150883" cy="1176995"/>
           </a:xfrm>
           <a:prstGeom prst="line">
@@ -4192,8 +4207,8 @@
         </p:nvSpPr>
         <p:spPr>
           <a:xfrm>
-            <a:off x="4265720" y="1498471"/>
-            <a:ext cx="2058879" cy="477054"/>
+            <a:off x="1219780" y="1602821"/>
+            <a:ext cx="2180323" cy="477054"/>
           </a:xfrm>
           <a:prstGeom prst="rect">
             <a:avLst/>
@@ -4214,7 +4229,7 @@
                   </a:solidFill>
                 </a:ln>
               </a:rPr>
-              <a:t>User A</a:t>
+              <a:t>User A’s Branch</a:t>
             </a:r>
           </a:p>
         </p:txBody>
@@ -4233,8 +4248,8 @@
         </p:nvSpPr>
         <p:spPr>
           <a:xfrm>
-            <a:off x="7010400" y="5111075"/>
-            <a:ext cx="2058879" cy="477054"/>
+            <a:off x="4104440" y="5155670"/>
+            <a:ext cx="2244810" cy="477054"/>
           </a:xfrm>
           <a:prstGeom prst="rect">
             <a:avLst/>
@@ -4255,7 +4270,7 @@
                   </a:solidFill>
                 </a:ln>
               </a:rPr>
-              <a:t>User B</a:t>
+              <a:t>User B’s Branch</a:t>
             </a:r>
             <a:endParaRPr lang="en-US" sz="2500" b="1" dirty="0">
               <a:ln w="9525">
@@ -4281,7 +4296,7 @@
         </p:nvSpPr>
         <p:spPr>
           <a:xfrm>
-            <a:off x="6217444" y="3174269"/>
+            <a:off x="321147" y="3158927"/>
             <a:ext cx="2058879" cy="477054"/>
           </a:xfrm>
           <a:prstGeom prst="rect">
@@ -4315,10 +4330,1055 @@
           </a:p>
         </p:txBody>
       </p:sp>
+      <p:cxnSp>
+        <p:nvCxnSpPr>
+          <p:cNvPr id="22" name="Straight Connector 21">
+            <a:extLst>
+              <a:ext uri="{FF2B5EF4-FFF2-40B4-BE49-F238E27FC236}">
+                <a16:creationId xmlns:a16="http://schemas.microsoft.com/office/drawing/2014/main" id="{C2E2D185-7B5A-154A-8B44-29B24C5A6C8E}"/>
+              </a:ext>
+            </a:extLst>
+          </p:cNvPr>
+          <p:cNvCxnSpPr>
+            <a:cxnSpLocks/>
+            <a:endCxn id="4" idx="2"/>
+          </p:cNvCxnSpPr>
+          <p:nvPr/>
+        </p:nvCxnSpPr>
+        <p:spPr>
+          <a:xfrm>
+            <a:off x="259492" y="3612150"/>
+            <a:ext cx="1206134" cy="0"/>
+          </a:xfrm>
+          <a:prstGeom prst="line">
+            <a:avLst/>
+          </a:prstGeom>
+          <a:ln w="28575">
+            <a:solidFill>
+              <a:schemeClr val="tx1"/>
+            </a:solidFill>
+          </a:ln>
+        </p:spPr>
+        <p:style>
+          <a:lnRef idx="1">
+            <a:schemeClr val="accent1"/>
+          </a:lnRef>
+          <a:fillRef idx="0">
+            <a:schemeClr val="accent1"/>
+          </a:fillRef>
+          <a:effectRef idx="0">
+            <a:schemeClr val="accent1"/>
+          </a:effectRef>
+          <a:fontRef idx="minor">
+            <a:schemeClr val="tx1"/>
+          </a:fontRef>
+        </p:style>
+      </p:cxnSp>
+      <p:cxnSp>
+        <p:nvCxnSpPr>
+          <p:cNvPr id="26" name="Straight Connector 25">
+            <a:extLst>
+              <a:ext uri="{FF2B5EF4-FFF2-40B4-BE49-F238E27FC236}">
+                <a16:creationId xmlns:a16="http://schemas.microsoft.com/office/drawing/2014/main" id="{888F075B-64DD-CF40-91E8-7C7EE10A27D2}"/>
+              </a:ext>
+            </a:extLst>
+          </p:cNvPr>
+          <p:cNvCxnSpPr>
+            <a:cxnSpLocks/>
+          </p:cNvCxnSpPr>
+          <p:nvPr/>
+        </p:nvCxnSpPr>
+        <p:spPr>
+          <a:xfrm>
+            <a:off x="11418608" y="3612150"/>
+            <a:ext cx="606062" cy="0"/>
+          </a:xfrm>
+          <a:prstGeom prst="line">
+            <a:avLst/>
+          </a:prstGeom>
+          <a:ln w="28575">
+            <a:solidFill>
+              <a:schemeClr val="tx1"/>
+            </a:solidFill>
+          </a:ln>
+        </p:spPr>
+        <p:style>
+          <a:lnRef idx="1">
+            <a:schemeClr val="accent1"/>
+          </a:lnRef>
+          <a:fillRef idx="0">
+            <a:schemeClr val="accent1"/>
+          </a:fillRef>
+          <a:effectRef idx="0">
+            <a:schemeClr val="accent1"/>
+          </a:effectRef>
+          <a:fontRef idx="minor">
+            <a:schemeClr val="tx1"/>
+          </a:fontRef>
+        </p:style>
+      </p:cxnSp>
+      <p:cxnSp>
+        <p:nvCxnSpPr>
+          <p:cNvPr id="28" name="Straight Connector 27">
+            <a:extLst>
+              <a:ext uri="{FF2B5EF4-FFF2-40B4-BE49-F238E27FC236}">
+                <a16:creationId xmlns:a16="http://schemas.microsoft.com/office/drawing/2014/main" id="{7A5A283E-6F3E-BD4C-B8D0-670A8B3C849B}"/>
+              </a:ext>
+            </a:extLst>
+          </p:cNvPr>
+          <p:cNvCxnSpPr>
+            <a:cxnSpLocks/>
+          </p:cNvCxnSpPr>
+          <p:nvPr/>
+        </p:nvCxnSpPr>
+        <p:spPr>
+          <a:xfrm flipV="1">
+            <a:off x="11869404" y="3612150"/>
+            <a:ext cx="155266" cy="228600"/>
+          </a:xfrm>
+          <a:prstGeom prst="line">
+            <a:avLst/>
+          </a:prstGeom>
+          <a:ln w="28575">
+            <a:solidFill>
+              <a:schemeClr val="tx1"/>
+            </a:solidFill>
+          </a:ln>
+        </p:spPr>
+        <p:style>
+          <a:lnRef idx="1">
+            <a:schemeClr val="accent1"/>
+          </a:lnRef>
+          <a:fillRef idx="0">
+            <a:schemeClr val="accent1"/>
+          </a:fillRef>
+          <a:effectRef idx="0">
+            <a:schemeClr val="accent1"/>
+          </a:effectRef>
+          <a:fontRef idx="minor">
+            <a:schemeClr val="tx1"/>
+          </a:fontRef>
+        </p:style>
+      </p:cxnSp>
+      <p:cxnSp>
+        <p:nvCxnSpPr>
+          <p:cNvPr id="31" name="Straight Connector 30">
+            <a:extLst>
+              <a:ext uri="{FF2B5EF4-FFF2-40B4-BE49-F238E27FC236}">
+                <a16:creationId xmlns:a16="http://schemas.microsoft.com/office/drawing/2014/main" id="{46AA290B-43A3-6C4B-94B6-55D885F71FD1}"/>
+              </a:ext>
+            </a:extLst>
+          </p:cNvPr>
+          <p:cNvCxnSpPr>
+            <a:cxnSpLocks/>
+          </p:cNvCxnSpPr>
+          <p:nvPr/>
+        </p:nvCxnSpPr>
+        <p:spPr>
+          <a:xfrm flipH="1" flipV="1">
+            <a:off x="11869404" y="3425153"/>
+            <a:ext cx="155266" cy="186997"/>
+          </a:xfrm>
+          <a:prstGeom prst="line">
+            <a:avLst/>
+          </a:prstGeom>
+          <a:ln w="28575">
+            <a:solidFill>
+              <a:schemeClr val="tx1"/>
+            </a:solidFill>
+          </a:ln>
+        </p:spPr>
+        <p:style>
+          <a:lnRef idx="1">
+            <a:schemeClr val="accent1"/>
+          </a:lnRef>
+          <a:fillRef idx="0">
+            <a:schemeClr val="accent1"/>
+          </a:fillRef>
+          <a:effectRef idx="0">
+            <a:schemeClr val="accent1"/>
+          </a:effectRef>
+          <a:fontRef idx="minor">
+            <a:schemeClr val="tx1"/>
+          </a:fontRef>
+        </p:style>
+      </p:cxnSp>
+      <p:sp>
+        <p:nvSpPr>
+          <p:cNvPr id="40" name="TextBox 39">
+            <a:extLst>
+              <a:ext uri="{FF2B5EF4-FFF2-40B4-BE49-F238E27FC236}">
+                <a16:creationId xmlns:a16="http://schemas.microsoft.com/office/drawing/2014/main" id="{27EDFAD1-EFED-624C-8E0E-5052112E5290}"/>
+              </a:ext>
+            </a:extLst>
+          </p:cNvPr>
+          <p:cNvSpPr txBox="1"/>
+          <p:nvPr/>
+        </p:nvSpPr>
+        <p:spPr>
+          <a:xfrm>
+            <a:off x="7454181" y="2135565"/>
+            <a:ext cx="2180323" cy="861774"/>
+          </a:xfrm>
+          <a:prstGeom prst="rect">
+            <a:avLst/>
+          </a:prstGeom>
+          <a:noFill/>
+        </p:spPr>
+        <p:txBody>
+          <a:bodyPr wrap="square" rtlCol="0">
+            <a:spAutoFit/>
+          </a:bodyPr>
+          <a:lstStyle/>
+          <a:p>
+            <a:r>
+              <a:rPr lang="en-US" sz="2500" dirty="0">
+                <a:ln w="9525">
+                  <a:solidFill>
+                    <a:schemeClr val="tx1"/>
+                  </a:solidFill>
+                </a:ln>
+              </a:rPr>
+              <a:t>Merge to Master Branch</a:t>
+            </a:r>
+          </a:p>
+        </p:txBody>
+      </p:sp>
+      <p:sp>
+        <p:nvSpPr>
+          <p:cNvPr id="41" name="TextBox 40">
+            <a:extLst>
+              <a:ext uri="{FF2B5EF4-FFF2-40B4-BE49-F238E27FC236}">
+                <a16:creationId xmlns:a16="http://schemas.microsoft.com/office/drawing/2014/main" id="{7FF42A7F-41A5-B247-961E-5DE344F5D522}"/>
+              </a:ext>
+            </a:extLst>
+          </p:cNvPr>
+          <p:cNvSpPr txBox="1"/>
+          <p:nvPr/>
+        </p:nvSpPr>
+        <p:spPr>
+          <a:xfrm>
+            <a:off x="7252001" y="4121976"/>
+            <a:ext cx="2180323" cy="861774"/>
+          </a:xfrm>
+          <a:prstGeom prst="rect">
+            <a:avLst/>
+          </a:prstGeom>
+          <a:noFill/>
+        </p:spPr>
+        <p:txBody>
+          <a:bodyPr wrap="square" rtlCol="0">
+            <a:spAutoFit/>
+          </a:bodyPr>
+          <a:lstStyle/>
+          <a:p>
+            <a:r>
+              <a:rPr lang="en-US" sz="2500" dirty="0">
+                <a:ln w="9525">
+                  <a:solidFill>
+                    <a:schemeClr val="tx1"/>
+                  </a:solidFill>
+                </a:ln>
+              </a:rPr>
+              <a:t>Merge to Master Branch</a:t>
+            </a:r>
+          </a:p>
+        </p:txBody>
+      </p:sp>
     </p:spTree>
     <p:extLst>
       <p:ext uri="{BB962C8B-B14F-4D97-AF65-F5344CB8AC3E}">
         <p14:creationId xmlns:p14="http://schemas.microsoft.com/office/powerpoint/2010/main" val="4167964890"/>
+      </p:ext>
+    </p:extLst>
+  </p:cSld>
+  <p:clrMapOvr>
+    <a:masterClrMapping/>
+  </p:clrMapOvr>
+</p:sld>
+</file>
+
+<file path=ppt/slides/slide2.xml><?xml version="1.0" encoding="utf-8"?>
+<p:sld xmlns:a="http://schemas.openxmlformats.org/drawingml/2006/main" xmlns:r="http://schemas.openxmlformats.org/officeDocument/2006/relationships" xmlns:p="http://schemas.openxmlformats.org/presentationml/2006/main">
+  <p:cSld>
+    <p:spTree>
+      <p:nvGrpSpPr>
+        <p:cNvPr id="1" name=""/>
+        <p:cNvGrpSpPr/>
+        <p:nvPr/>
+      </p:nvGrpSpPr>
+      <p:grpSpPr>
+        <a:xfrm>
+          <a:off x="0" y="0"/>
+          <a:ext cx="0" cy="0"/>
+          <a:chOff x="0" y="0"/>
+          <a:chExt cx="0" cy="0"/>
+        </a:xfrm>
+      </p:grpSpPr>
+      <p:sp>
+        <p:nvSpPr>
+          <p:cNvPr id="2" name="Right Arrow 1">
+            <a:extLst>
+              <a:ext uri="{FF2B5EF4-FFF2-40B4-BE49-F238E27FC236}">
+                <a16:creationId xmlns:a16="http://schemas.microsoft.com/office/drawing/2014/main" id="{C0482000-56DD-C14D-897B-6765E766FDD2}"/>
+              </a:ext>
+            </a:extLst>
+          </p:cNvPr>
+          <p:cNvSpPr/>
+          <p:nvPr/>
+        </p:nvSpPr>
+        <p:spPr>
+          <a:xfrm>
+            <a:off x="1198606" y="109147"/>
+            <a:ext cx="4312508" cy="951471"/>
+          </a:xfrm>
+          <a:prstGeom prst="rightArrow">
+            <a:avLst/>
+          </a:prstGeom>
+          <a:solidFill>
+            <a:srgbClr val="FFFF00"/>
+          </a:solidFill>
+          <a:ln>
+            <a:solidFill>
+              <a:schemeClr val="tx1"/>
+            </a:solidFill>
+          </a:ln>
+        </p:spPr>
+        <p:style>
+          <a:lnRef idx="2">
+            <a:schemeClr val="accent1">
+              <a:shade val="50000"/>
+            </a:schemeClr>
+          </a:lnRef>
+          <a:fillRef idx="1">
+            <a:schemeClr val="accent1"/>
+          </a:fillRef>
+          <a:effectRef idx="0">
+            <a:schemeClr val="accent1"/>
+          </a:effectRef>
+          <a:fontRef idx="minor">
+            <a:schemeClr val="lt1"/>
+          </a:fontRef>
+        </p:style>
+        <p:txBody>
+          <a:bodyPr rtlCol="0" anchor="ctr"/>
+          <a:lstStyle/>
+          <a:p>
+            <a:pPr algn="ctr"/>
+            <a:r>
+              <a:rPr lang="en-US" dirty="0">
+                <a:solidFill>
+                  <a:sysClr val="windowText" lastClr="000000"/>
+                </a:solidFill>
+              </a:rPr>
+              <a:t>commit -a</a:t>
+            </a:r>
+          </a:p>
+        </p:txBody>
+      </p:sp>
+      <p:sp>
+        <p:nvSpPr>
+          <p:cNvPr id="3" name="Right Arrow 2">
+            <a:extLst>
+              <a:ext uri="{FF2B5EF4-FFF2-40B4-BE49-F238E27FC236}">
+                <a16:creationId xmlns:a16="http://schemas.microsoft.com/office/drawing/2014/main" id="{E590D763-312B-E144-81BD-DD15DCB4379D}"/>
+              </a:ext>
+            </a:extLst>
+          </p:cNvPr>
+          <p:cNvSpPr/>
+          <p:nvPr/>
+        </p:nvSpPr>
+        <p:spPr>
+          <a:xfrm>
+            <a:off x="3336320" y="1132703"/>
+            <a:ext cx="2162433" cy="951471"/>
+          </a:xfrm>
+          <a:prstGeom prst="rightArrow">
+            <a:avLst/>
+          </a:prstGeom>
+          <a:solidFill>
+            <a:srgbClr val="FFFF00"/>
+          </a:solidFill>
+          <a:ln>
+            <a:solidFill>
+              <a:schemeClr val="tx1"/>
+            </a:solidFill>
+          </a:ln>
+        </p:spPr>
+        <p:style>
+          <a:lnRef idx="2">
+            <a:schemeClr val="accent1">
+              <a:shade val="50000"/>
+            </a:schemeClr>
+          </a:lnRef>
+          <a:fillRef idx="1">
+            <a:schemeClr val="accent1"/>
+          </a:fillRef>
+          <a:effectRef idx="0">
+            <a:schemeClr val="accent1"/>
+          </a:effectRef>
+          <a:fontRef idx="minor">
+            <a:schemeClr val="lt1"/>
+          </a:fontRef>
+        </p:style>
+        <p:txBody>
+          <a:bodyPr rtlCol="0" anchor="ctr"/>
+          <a:lstStyle/>
+          <a:p>
+            <a:pPr algn="ctr"/>
+            <a:r>
+              <a:rPr lang="en-US" dirty="0">
+                <a:solidFill>
+                  <a:sysClr val="windowText" lastClr="000000"/>
+                </a:solidFill>
+              </a:rPr>
+              <a:t>commit</a:t>
+            </a:r>
+          </a:p>
+        </p:txBody>
+      </p:sp>
+      <p:sp>
+        <p:nvSpPr>
+          <p:cNvPr id="4" name="Right Arrow 3">
+            <a:extLst>
+              <a:ext uri="{FF2B5EF4-FFF2-40B4-BE49-F238E27FC236}">
+                <a16:creationId xmlns:a16="http://schemas.microsoft.com/office/drawing/2014/main" id="{026DEC0C-CCCC-FD45-B7D3-73267702DA56}"/>
+              </a:ext>
+            </a:extLst>
+          </p:cNvPr>
+          <p:cNvSpPr/>
+          <p:nvPr/>
+        </p:nvSpPr>
+        <p:spPr>
+          <a:xfrm>
+            <a:off x="1198607" y="1132702"/>
+            <a:ext cx="2125354" cy="951471"/>
+          </a:xfrm>
+          <a:prstGeom prst="rightArrow">
+            <a:avLst/>
+          </a:prstGeom>
+          <a:solidFill>
+            <a:schemeClr val="accent2"/>
+          </a:solidFill>
+          <a:ln>
+            <a:solidFill>
+              <a:schemeClr val="tx1"/>
+            </a:solidFill>
+          </a:ln>
+        </p:spPr>
+        <p:style>
+          <a:lnRef idx="2">
+            <a:schemeClr val="accent1">
+              <a:shade val="50000"/>
+            </a:schemeClr>
+          </a:lnRef>
+          <a:fillRef idx="1">
+            <a:schemeClr val="accent1"/>
+          </a:fillRef>
+          <a:effectRef idx="0">
+            <a:schemeClr val="accent1"/>
+          </a:effectRef>
+          <a:fontRef idx="minor">
+            <a:schemeClr val="lt1"/>
+          </a:fontRef>
+        </p:style>
+        <p:txBody>
+          <a:bodyPr rtlCol="0" anchor="ctr"/>
+          <a:lstStyle/>
+          <a:p>
+            <a:pPr algn="ctr"/>
+            <a:r>
+              <a:rPr lang="en-US" dirty="0">
+                <a:solidFill>
+                  <a:sysClr val="windowText" lastClr="000000"/>
+                </a:solidFill>
+              </a:rPr>
+              <a:t>add</a:t>
+            </a:r>
+          </a:p>
+        </p:txBody>
+      </p:sp>
+      <p:sp>
+        <p:nvSpPr>
+          <p:cNvPr id="5" name="Right Arrow 4">
+            <a:extLst>
+              <a:ext uri="{FF2B5EF4-FFF2-40B4-BE49-F238E27FC236}">
+                <a16:creationId xmlns:a16="http://schemas.microsoft.com/office/drawing/2014/main" id="{1F6D9152-4671-9443-A9F1-1B8ECF284648}"/>
+              </a:ext>
+            </a:extLst>
+          </p:cNvPr>
+          <p:cNvSpPr/>
+          <p:nvPr/>
+        </p:nvSpPr>
+        <p:spPr>
+          <a:xfrm>
+            <a:off x="5511113" y="2012089"/>
+            <a:ext cx="2162433" cy="951471"/>
+          </a:xfrm>
+          <a:prstGeom prst="rightArrow">
+            <a:avLst/>
+          </a:prstGeom>
+          <a:solidFill>
+            <a:srgbClr val="0070C0"/>
+          </a:solidFill>
+          <a:ln>
+            <a:solidFill>
+              <a:schemeClr val="tx1"/>
+            </a:solidFill>
+          </a:ln>
+        </p:spPr>
+        <p:style>
+          <a:lnRef idx="2">
+            <a:schemeClr val="accent1">
+              <a:shade val="50000"/>
+            </a:schemeClr>
+          </a:lnRef>
+          <a:fillRef idx="1">
+            <a:schemeClr val="accent1"/>
+          </a:fillRef>
+          <a:effectRef idx="0">
+            <a:schemeClr val="accent1"/>
+          </a:effectRef>
+          <a:fontRef idx="minor">
+            <a:schemeClr val="lt1"/>
+          </a:fontRef>
+        </p:style>
+        <p:txBody>
+          <a:bodyPr rtlCol="0" anchor="ctr"/>
+          <a:lstStyle/>
+          <a:p>
+            <a:pPr algn="ctr"/>
+            <a:r>
+              <a:rPr lang="en-US" dirty="0">
+                <a:solidFill>
+                  <a:sysClr val="windowText" lastClr="000000"/>
+                </a:solidFill>
+              </a:rPr>
+              <a:t>push</a:t>
+            </a:r>
+          </a:p>
+        </p:txBody>
+      </p:sp>
+      <p:sp>
+        <p:nvSpPr>
+          <p:cNvPr id="6" name="Oval 5">
+            <a:extLst>
+              <a:ext uri="{FF2B5EF4-FFF2-40B4-BE49-F238E27FC236}">
+                <a16:creationId xmlns:a16="http://schemas.microsoft.com/office/drawing/2014/main" id="{64BDB391-B58A-8043-ACF3-CC55D6F4776D}"/>
+              </a:ext>
+            </a:extLst>
+          </p:cNvPr>
+          <p:cNvSpPr/>
+          <p:nvPr/>
+        </p:nvSpPr>
+        <p:spPr>
+          <a:xfrm>
+            <a:off x="302739" y="3107730"/>
+            <a:ext cx="1767015" cy="634310"/>
+          </a:xfrm>
+          <a:prstGeom prst="ellipse">
+            <a:avLst/>
+          </a:prstGeom>
+          <a:solidFill>
+            <a:schemeClr val="accent3"/>
+          </a:solidFill>
+        </p:spPr>
+        <p:style>
+          <a:lnRef idx="2">
+            <a:schemeClr val="accent1">
+              <a:shade val="50000"/>
+            </a:schemeClr>
+          </a:lnRef>
+          <a:fillRef idx="1">
+            <a:schemeClr val="accent1"/>
+          </a:fillRef>
+          <a:effectRef idx="0">
+            <a:schemeClr val="accent1"/>
+          </a:effectRef>
+          <a:fontRef idx="minor">
+            <a:schemeClr val="lt1"/>
+          </a:fontRef>
+        </p:style>
+        <p:txBody>
+          <a:bodyPr rtlCol="0" anchor="ctr"/>
+          <a:lstStyle/>
+          <a:p>
+            <a:pPr algn="ctr"/>
+            <a:r>
+              <a:rPr lang="en-US" dirty="0">
+                <a:solidFill>
+                  <a:sysClr val="windowText" lastClr="000000"/>
+                </a:solidFill>
+              </a:rPr>
+              <a:t>workspace</a:t>
+            </a:r>
+          </a:p>
+        </p:txBody>
+      </p:sp>
+      <p:sp>
+        <p:nvSpPr>
+          <p:cNvPr id="7" name="Oval 6">
+            <a:extLst>
+              <a:ext uri="{FF2B5EF4-FFF2-40B4-BE49-F238E27FC236}">
+                <a16:creationId xmlns:a16="http://schemas.microsoft.com/office/drawing/2014/main" id="{D70ABA64-6B53-5249-BA8B-7600BF5BE3D8}"/>
+              </a:ext>
+            </a:extLst>
+          </p:cNvPr>
+          <p:cNvSpPr/>
+          <p:nvPr/>
+        </p:nvSpPr>
+        <p:spPr>
+          <a:xfrm>
+            <a:off x="2465172" y="3107730"/>
+            <a:ext cx="1767015" cy="634310"/>
+          </a:xfrm>
+          <a:prstGeom prst="ellipse">
+            <a:avLst/>
+          </a:prstGeom>
+          <a:solidFill>
+            <a:schemeClr val="accent2"/>
+          </a:solidFill>
+        </p:spPr>
+        <p:style>
+          <a:lnRef idx="2">
+            <a:schemeClr val="accent1">
+              <a:shade val="50000"/>
+            </a:schemeClr>
+          </a:lnRef>
+          <a:fillRef idx="1">
+            <a:schemeClr val="accent1"/>
+          </a:fillRef>
+          <a:effectRef idx="0">
+            <a:schemeClr val="accent1"/>
+          </a:effectRef>
+          <a:fontRef idx="minor">
+            <a:schemeClr val="lt1"/>
+          </a:fontRef>
+        </p:style>
+        <p:txBody>
+          <a:bodyPr rtlCol="0" anchor="ctr"/>
+          <a:lstStyle/>
+          <a:p>
+            <a:pPr algn="ctr"/>
+            <a:r>
+              <a:rPr lang="en-US" dirty="0">
+                <a:solidFill>
+                  <a:sysClr val="windowText" lastClr="000000"/>
+                </a:solidFill>
+              </a:rPr>
+              <a:t>index</a:t>
+            </a:r>
+          </a:p>
+        </p:txBody>
+      </p:sp>
+      <p:sp>
+        <p:nvSpPr>
+          <p:cNvPr id="8" name="Oval 7">
+            <a:extLst>
+              <a:ext uri="{FF2B5EF4-FFF2-40B4-BE49-F238E27FC236}">
+                <a16:creationId xmlns:a16="http://schemas.microsoft.com/office/drawing/2014/main" id="{B1383905-BFC3-5A44-89CE-E4BE03931E12}"/>
+              </a:ext>
+            </a:extLst>
+          </p:cNvPr>
+          <p:cNvSpPr/>
+          <p:nvPr/>
+        </p:nvSpPr>
+        <p:spPr>
+          <a:xfrm>
+            <a:off x="4627605" y="3107730"/>
+            <a:ext cx="1767015" cy="634310"/>
+          </a:xfrm>
+          <a:prstGeom prst="ellipse">
+            <a:avLst/>
+          </a:prstGeom>
+          <a:solidFill>
+            <a:srgbClr val="FFFF00"/>
+          </a:solidFill>
+        </p:spPr>
+        <p:style>
+          <a:lnRef idx="2">
+            <a:schemeClr val="accent1">
+              <a:shade val="50000"/>
+            </a:schemeClr>
+          </a:lnRef>
+          <a:fillRef idx="1">
+            <a:schemeClr val="accent1"/>
+          </a:fillRef>
+          <a:effectRef idx="0">
+            <a:schemeClr val="accent1"/>
+          </a:effectRef>
+          <a:fontRef idx="minor">
+            <a:schemeClr val="lt1"/>
+          </a:fontRef>
+        </p:style>
+        <p:txBody>
+          <a:bodyPr rtlCol="0" anchor="ctr"/>
+          <a:lstStyle/>
+          <a:p>
+            <a:pPr algn="ctr"/>
+            <a:r>
+              <a:rPr lang="en-US" dirty="0">
+                <a:solidFill>
+                  <a:sysClr val="windowText" lastClr="000000"/>
+                </a:solidFill>
+              </a:rPr>
+              <a:t>local repository</a:t>
+            </a:r>
+          </a:p>
+        </p:txBody>
+      </p:sp>
+      <p:sp>
+        <p:nvSpPr>
+          <p:cNvPr id="9" name="Oval 8">
+            <a:extLst>
+              <a:ext uri="{FF2B5EF4-FFF2-40B4-BE49-F238E27FC236}">
+                <a16:creationId xmlns:a16="http://schemas.microsoft.com/office/drawing/2014/main" id="{7957D10B-45C4-F64F-9302-932358004722}"/>
+              </a:ext>
+            </a:extLst>
+          </p:cNvPr>
+          <p:cNvSpPr/>
+          <p:nvPr/>
+        </p:nvSpPr>
+        <p:spPr>
+          <a:xfrm>
+            <a:off x="6790038" y="3107730"/>
+            <a:ext cx="1767015" cy="634310"/>
+          </a:xfrm>
+          <a:prstGeom prst="ellipse">
+            <a:avLst/>
+          </a:prstGeom>
+          <a:solidFill>
+            <a:srgbClr val="0070C0"/>
+          </a:solidFill>
+        </p:spPr>
+        <p:style>
+          <a:lnRef idx="2">
+            <a:schemeClr val="accent1">
+              <a:shade val="50000"/>
+            </a:schemeClr>
+          </a:lnRef>
+          <a:fillRef idx="1">
+            <a:schemeClr val="accent1"/>
+          </a:fillRef>
+          <a:effectRef idx="0">
+            <a:schemeClr val="accent1"/>
+          </a:effectRef>
+          <a:fontRef idx="minor">
+            <a:schemeClr val="lt1"/>
+          </a:fontRef>
+        </p:style>
+        <p:txBody>
+          <a:bodyPr rtlCol="0" anchor="ctr"/>
+          <a:lstStyle/>
+          <a:p>
+            <a:pPr algn="ctr"/>
+            <a:r>
+              <a:rPr lang="en-US" dirty="0">
+                <a:solidFill>
+                  <a:sysClr val="windowText" lastClr="000000"/>
+                </a:solidFill>
+              </a:rPr>
+              <a:t>remote repository</a:t>
+            </a:r>
+          </a:p>
+        </p:txBody>
+      </p:sp>
+      <p:sp>
+        <p:nvSpPr>
+          <p:cNvPr id="10" name="Right Arrow 9">
+            <a:extLst>
+              <a:ext uri="{FF2B5EF4-FFF2-40B4-BE49-F238E27FC236}">
+                <a16:creationId xmlns:a16="http://schemas.microsoft.com/office/drawing/2014/main" id="{D29F20A5-00F3-E04B-9ACB-2164ABE5E29C}"/>
+              </a:ext>
+            </a:extLst>
+          </p:cNvPr>
+          <p:cNvSpPr/>
+          <p:nvPr/>
+        </p:nvSpPr>
+        <p:spPr>
+          <a:xfrm flipH="1">
+            <a:off x="1186246" y="3886210"/>
+            <a:ext cx="6487298" cy="951471"/>
+          </a:xfrm>
+          <a:prstGeom prst="rightArrow">
+            <a:avLst/>
+          </a:prstGeom>
+          <a:solidFill>
+            <a:srgbClr val="0070C0"/>
+          </a:solidFill>
+          <a:ln>
+            <a:solidFill>
+              <a:schemeClr val="tx1"/>
+            </a:solidFill>
+          </a:ln>
+        </p:spPr>
+        <p:style>
+          <a:lnRef idx="2">
+            <a:schemeClr val="accent1">
+              <a:shade val="50000"/>
+            </a:schemeClr>
+          </a:lnRef>
+          <a:fillRef idx="1">
+            <a:schemeClr val="accent1"/>
+          </a:fillRef>
+          <a:effectRef idx="0">
+            <a:schemeClr val="accent1"/>
+          </a:effectRef>
+          <a:fontRef idx="minor">
+            <a:schemeClr val="lt1"/>
+          </a:fontRef>
+        </p:style>
+        <p:txBody>
+          <a:bodyPr rtlCol="0" anchor="ctr"/>
+          <a:lstStyle/>
+          <a:p>
+            <a:pPr algn="ctr"/>
+            <a:r>
+              <a:rPr lang="en-US" dirty="0">
+                <a:solidFill>
+                  <a:sysClr val="windowText" lastClr="000000"/>
+                </a:solidFill>
+              </a:rPr>
+              <a:t>pull</a:t>
+            </a:r>
+          </a:p>
+        </p:txBody>
+      </p:sp>
+      <p:cxnSp>
+        <p:nvCxnSpPr>
+          <p:cNvPr id="16" name="Straight Connector 15">
+            <a:extLst>
+              <a:ext uri="{FF2B5EF4-FFF2-40B4-BE49-F238E27FC236}">
+                <a16:creationId xmlns:a16="http://schemas.microsoft.com/office/drawing/2014/main" id="{FABC94B1-7ECF-1E4A-8BA0-EBB0619EFE25}"/>
+              </a:ext>
+            </a:extLst>
+          </p:cNvPr>
+          <p:cNvCxnSpPr>
+            <a:cxnSpLocks/>
+            <a:endCxn id="6" idx="0"/>
+          </p:cNvCxnSpPr>
+          <p:nvPr/>
+        </p:nvCxnSpPr>
+        <p:spPr>
+          <a:xfrm flipH="1">
+            <a:off x="1186247" y="234778"/>
+            <a:ext cx="12360" cy="2872952"/>
+          </a:xfrm>
+          <a:prstGeom prst="line">
+            <a:avLst/>
+          </a:prstGeom>
+        </p:spPr>
+        <p:style>
+          <a:lnRef idx="3">
+            <a:schemeClr val="dk1"/>
+          </a:lnRef>
+          <a:fillRef idx="0">
+            <a:schemeClr val="dk1"/>
+          </a:fillRef>
+          <a:effectRef idx="2">
+            <a:schemeClr val="dk1"/>
+          </a:effectRef>
+          <a:fontRef idx="minor">
+            <a:schemeClr val="tx1"/>
+          </a:fontRef>
+        </p:style>
+      </p:cxnSp>
+      <p:cxnSp>
+        <p:nvCxnSpPr>
+          <p:cNvPr id="19" name="Straight Connector 18">
+            <a:extLst>
+              <a:ext uri="{FF2B5EF4-FFF2-40B4-BE49-F238E27FC236}">
+                <a16:creationId xmlns:a16="http://schemas.microsoft.com/office/drawing/2014/main" id="{CE9DDE21-286E-0445-861A-F2A65E0F026A}"/>
+              </a:ext>
+            </a:extLst>
+          </p:cNvPr>
+          <p:cNvCxnSpPr>
+            <a:cxnSpLocks/>
+            <a:endCxn id="7" idx="0"/>
+          </p:cNvCxnSpPr>
+          <p:nvPr/>
+        </p:nvCxnSpPr>
+        <p:spPr>
+          <a:xfrm>
+            <a:off x="3348679" y="1132702"/>
+            <a:ext cx="1" cy="1975028"/>
+          </a:xfrm>
+          <a:prstGeom prst="line">
+            <a:avLst/>
+          </a:prstGeom>
+        </p:spPr>
+        <p:style>
+          <a:lnRef idx="3">
+            <a:schemeClr val="dk1"/>
+          </a:lnRef>
+          <a:fillRef idx="0">
+            <a:schemeClr val="dk1"/>
+          </a:fillRef>
+          <a:effectRef idx="2">
+            <a:schemeClr val="dk1"/>
+          </a:effectRef>
+          <a:fontRef idx="minor">
+            <a:schemeClr val="tx1"/>
+          </a:fontRef>
+        </p:style>
+      </p:cxnSp>
+      <p:cxnSp>
+        <p:nvCxnSpPr>
+          <p:cNvPr id="22" name="Straight Connector 21">
+            <a:extLst>
+              <a:ext uri="{FF2B5EF4-FFF2-40B4-BE49-F238E27FC236}">
+                <a16:creationId xmlns:a16="http://schemas.microsoft.com/office/drawing/2014/main" id="{83058D06-E45C-7244-B1F0-2CB1FEA3018C}"/>
+              </a:ext>
+            </a:extLst>
+          </p:cNvPr>
+          <p:cNvCxnSpPr>
+            <a:cxnSpLocks/>
+            <a:endCxn id="8" idx="0"/>
+          </p:cNvCxnSpPr>
+          <p:nvPr/>
+        </p:nvCxnSpPr>
+        <p:spPr>
+          <a:xfrm flipH="1">
+            <a:off x="5511113" y="234778"/>
+            <a:ext cx="37080" cy="2872952"/>
+          </a:xfrm>
+          <a:prstGeom prst="line">
+            <a:avLst/>
+          </a:prstGeom>
+        </p:spPr>
+        <p:style>
+          <a:lnRef idx="3">
+            <a:schemeClr val="dk1"/>
+          </a:lnRef>
+          <a:fillRef idx="0">
+            <a:schemeClr val="dk1"/>
+          </a:fillRef>
+          <a:effectRef idx="2">
+            <a:schemeClr val="dk1"/>
+          </a:effectRef>
+          <a:fontRef idx="minor">
+            <a:schemeClr val="tx1"/>
+          </a:fontRef>
+        </p:style>
+      </p:cxnSp>
+      <p:cxnSp>
+        <p:nvCxnSpPr>
+          <p:cNvPr id="24" name="Straight Connector 23">
+            <a:extLst>
+              <a:ext uri="{FF2B5EF4-FFF2-40B4-BE49-F238E27FC236}">
+                <a16:creationId xmlns:a16="http://schemas.microsoft.com/office/drawing/2014/main" id="{7E87AE18-9F6C-F341-9333-E9B1EC02D9CF}"/>
+              </a:ext>
+            </a:extLst>
+          </p:cNvPr>
+          <p:cNvCxnSpPr>
+            <a:cxnSpLocks/>
+          </p:cNvCxnSpPr>
+          <p:nvPr/>
+        </p:nvCxnSpPr>
+        <p:spPr>
+          <a:xfrm>
+            <a:off x="7685906" y="2084173"/>
+            <a:ext cx="0" cy="1026647"/>
+          </a:xfrm>
+          <a:prstGeom prst="line">
+            <a:avLst/>
+          </a:prstGeom>
+        </p:spPr>
+        <p:style>
+          <a:lnRef idx="3">
+            <a:schemeClr val="dk1"/>
+          </a:lnRef>
+          <a:fillRef idx="0">
+            <a:schemeClr val="dk1"/>
+          </a:fillRef>
+          <a:effectRef idx="2">
+            <a:schemeClr val="dk1"/>
+          </a:effectRef>
+          <a:fontRef idx="minor">
+            <a:schemeClr val="tx1"/>
+          </a:fontRef>
+        </p:style>
+      </p:cxnSp>
+      <p:cxnSp>
+        <p:nvCxnSpPr>
+          <p:cNvPr id="27" name="Straight Connector 26">
+            <a:extLst>
+              <a:ext uri="{FF2B5EF4-FFF2-40B4-BE49-F238E27FC236}">
+                <a16:creationId xmlns:a16="http://schemas.microsoft.com/office/drawing/2014/main" id="{DE47E0C8-CCEE-0249-9739-147B9782A8DE}"/>
+              </a:ext>
+            </a:extLst>
+          </p:cNvPr>
+          <p:cNvCxnSpPr>
+            <a:cxnSpLocks/>
+          </p:cNvCxnSpPr>
+          <p:nvPr/>
+        </p:nvCxnSpPr>
+        <p:spPr>
+          <a:xfrm>
+            <a:off x="7685906" y="3742040"/>
+            <a:ext cx="0" cy="1026647"/>
+          </a:xfrm>
+          <a:prstGeom prst="line">
+            <a:avLst/>
+          </a:prstGeom>
+        </p:spPr>
+        <p:style>
+          <a:lnRef idx="3">
+            <a:schemeClr val="dk1"/>
+          </a:lnRef>
+          <a:fillRef idx="0">
+            <a:schemeClr val="dk1"/>
+          </a:fillRef>
+          <a:effectRef idx="2">
+            <a:schemeClr val="dk1"/>
+          </a:effectRef>
+          <a:fontRef idx="minor">
+            <a:schemeClr val="tx1"/>
+          </a:fontRef>
+        </p:style>
+      </p:cxnSp>
+      <p:cxnSp>
+        <p:nvCxnSpPr>
+          <p:cNvPr id="28" name="Straight Connector 27">
+            <a:extLst>
+              <a:ext uri="{FF2B5EF4-FFF2-40B4-BE49-F238E27FC236}">
+                <a16:creationId xmlns:a16="http://schemas.microsoft.com/office/drawing/2014/main" id="{2A78E318-AB83-D84F-B144-F29E3B999406}"/>
+              </a:ext>
+            </a:extLst>
+          </p:cNvPr>
+          <p:cNvCxnSpPr>
+            <a:cxnSpLocks/>
+          </p:cNvCxnSpPr>
+          <p:nvPr/>
+        </p:nvCxnSpPr>
+        <p:spPr>
+          <a:xfrm>
+            <a:off x="1186246" y="3742039"/>
+            <a:ext cx="0" cy="1026647"/>
+          </a:xfrm>
+          <a:prstGeom prst="line">
+            <a:avLst/>
+          </a:prstGeom>
+        </p:spPr>
+        <p:style>
+          <a:lnRef idx="3">
+            <a:schemeClr val="dk1"/>
+          </a:lnRef>
+          <a:fillRef idx="0">
+            <a:schemeClr val="dk1"/>
+          </a:fillRef>
+          <a:effectRef idx="2">
+            <a:schemeClr val="dk1"/>
+          </a:effectRef>
+          <a:fontRef idx="minor">
+            <a:schemeClr val="tx1"/>
+          </a:fontRef>
+        </p:style>
+      </p:cxnSp>
+    </p:spTree>
+    <p:extLst>
+      <p:ext uri="{BB962C8B-B14F-4D97-AF65-F5344CB8AC3E}">
+        <p14:creationId xmlns:p14="http://schemas.microsoft.com/office/powerpoint/2010/main" val="1862230629"/>
       </p:ext>
     </p:extLst>
   </p:cSld>

</xml_diff>